<commit_message>
Added slides to DDD presentation
</commit_message>
<xml_diff>
--- a/2019-10-26 Implementing DDD/Presentation.pptx
+++ b/2019-10-26 Implementing DDD/Presentation.pptx
@@ -21,6 +21,13 @@
     <p:sldId id="268" r:id="rId15"/>
     <p:sldId id="273" r:id="rId16"/>
     <p:sldId id="274" r:id="rId17"/>
+    <p:sldId id="275" r:id="rId18"/>
+    <p:sldId id="276" r:id="rId19"/>
+    <p:sldId id="277" r:id="rId20"/>
+    <p:sldId id="279" r:id="rId21"/>
+    <p:sldId id="280" r:id="rId22"/>
+    <p:sldId id="282" r:id="rId23"/>
+    <p:sldId id="278" r:id="rId24"/>
   </p:sldIdLst>
   <p:sldSz cx="12192000" cy="6858000"/>
   <p:notesSz cx="6858000" cy="9144000"/>
@@ -119,6 +126,11 @@
       </a:defRPr>
     </a:lvl9pPr>
   </p:defaultTextStyle>
+  <p:extLst>
+    <p:ext uri="{EFAFB233-063F-42B5-8137-9DF3F51BA10A}">
+      <p15:sldGuideLst xmlns:p15="http://schemas.microsoft.com/office/powerpoint/2012/main"/>
+    </p:ext>
+  </p:extLst>
 </p:presentation>
 </file>
 
@@ -4818,10 +4830,10 @@
       </p:sp>
       <p:pic>
         <p:nvPicPr>
-          <p:cNvPr id="4" name="Picture 3">
-            <a:extLst>
-              <a:ext uri="{FF2B5EF4-FFF2-40B4-BE49-F238E27FC236}">
-                <a16:creationId xmlns:a16="http://schemas.microsoft.com/office/drawing/2014/main" id="{F56B9422-BB0B-40C7-8C04-EEAC6917CC4A}"/>
+          <p:cNvPr id="5" name="Picture 4">
+            <a:extLst>
+              <a:ext uri="{FF2B5EF4-FFF2-40B4-BE49-F238E27FC236}">
+                <a16:creationId xmlns:a16="http://schemas.microsoft.com/office/drawing/2014/main" id="{62E158DF-9FAB-400A-9EE0-123D4865975C}"/>
               </a:ext>
             </a:extLst>
           </p:cNvPr>
@@ -4838,8 +4850,8 @@
         </p:blipFill>
         <p:spPr>
           <a:xfrm>
-            <a:off x="838199" y="2832971"/>
-            <a:ext cx="8712087" cy="3555954"/>
+            <a:off x="838200" y="2843408"/>
+            <a:ext cx="6957651" cy="3786982"/>
           </a:xfrm>
           <a:prstGeom prst="rect">
             <a:avLst/>
@@ -4990,6 +5002,402 @@
 </p:sld>
 </file>
 
+<file path=ppt/slides/slide17.xml><?xml version="1.0" encoding="utf-8"?>
+<p:sld xmlns:a="http://schemas.openxmlformats.org/drawingml/2006/main" xmlns:r="http://schemas.openxmlformats.org/officeDocument/2006/relationships" xmlns:p="http://schemas.openxmlformats.org/presentationml/2006/main">
+  <p:cSld>
+    <p:spTree>
+      <p:nvGrpSpPr>
+        <p:cNvPr id="1" name=""/>
+        <p:cNvGrpSpPr/>
+        <p:nvPr/>
+      </p:nvGrpSpPr>
+      <p:grpSpPr>
+        <a:xfrm>
+          <a:off x="0" y="0"/>
+          <a:ext cx="0" cy="0"/>
+          <a:chOff x="0" y="0"/>
+          <a:chExt cx="0" cy="0"/>
+        </a:xfrm>
+      </p:grpSpPr>
+      <p:sp>
+        <p:nvSpPr>
+          <p:cNvPr id="2" name="Title 1">
+            <a:extLst>
+              <a:ext uri="{FF2B5EF4-FFF2-40B4-BE49-F238E27FC236}">
+                <a16:creationId xmlns:a16="http://schemas.microsoft.com/office/drawing/2014/main" id="{BDD446CD-C68E-4B34-9354-E8F68D0EB962}"/>
+              </a:ext>
+            </a:extLst>
+          </p:cNvPr>
+          <p:cNvSpPr>
+            <a:spLocks noGrp="1"/>
+          </p:cNvSpPr>
+          <p:nvPr>
+            <p:ph type="title"/>
+          </p:nvPr>
+        </p:nvSpPr>
+        <p:spPr/>
+        <p:txBody>
+          <a:bodyPr/>
+          <a:lstStyle/>
+          <a:p>
+            <a:r>
+              <a:rPr lang="en-US" dirty="0"/>
+              <a:t>Repositories</a:t>
+            </a:r>
+            <a:br>
+              <a:rPr lang="en-US" dirty="0"/>
+            </a:br>
+            <a:r>
+              <a:rPr lang="en-US" sz="3600" dirty="0"/>
+              <a:t>Principles</a:t>
+            </a:r>
+            <a:endParaRPr lang="en-US" dirty="0"/>
+          </a:p>
+        </p:txBody>
+      </p:sp>
+      <p:sp>
+        <p:nvSpPr>
+          <p:cNvPr id="3" name="Content Placeholder 2">
+            <a:extLst>
+              <a:ext uri="{FF2B5EF4-FFF2-40B4-BE49-F238E27FC236}">
+                <a16:creationId xmlns:a16="http://schemas.microsoft.com/office/drawing/2014/main" id="{D4177B28-2B93-49AF-A420-DECFC76E329B}"/>
+              </a:ext>
+            </a:extLst>
+          </p:cNvPr>
+          <p:cNvSpPr>
+            <a:spLocks noGrp="1"/>
+          </p:cNvSpPr>
+          <p:nvPr>
+            <p:ph idx="1"/>
+          </p:nvPr>
+        </p:nvSpPr>
+        <p:spPr/>
+        <p:txBody>
+          <a:bodyPr/>
+          <a:lstStyle/>
+          <a:p>
+            <a:r>
+              <a:rPr lang="en-US" dirty="0"/>
+              <a:t>Define interface in the domain layer, implement in the infrastructure</a:t>
+            </a:r>
+          </a:p>
+          <a:p>
+            <a:r>
+              <a:rPr lang="en-US" dirty="0"/>
+              <a:t>Do not include domain logic</a:t>
+            </a:r>
+          </a:p>
+          <a:p>
+            <a:r>
+              <a:rPr lang="en-US" dirty="0"/>
+              <a:t>Repository interface should be database provider / ORM independent</a:t>
+            </a:r>
+          </a:p>
+          <a:p>
+            <a:r>
+              <a:rPr lang="en-US" dirty="0"/>
+              <a:t>Create repositories for </a:t>
+            </a:r>
+            <a:r>
+              <a:rPr lang="en-US" b="1" dirty="0"/>
+              <a:t>aggregate roots</a:t>
+            </a:r>
+            <a:r>
+              <a:rPr lang="en-US" dirty="0"/>
+              <a:t>, not entities</a:t>
+            </a:r>
+          </a:p>
+        </p:txBody>
+      </p:sp>
+    </p:spTree>
+    <p:extLst>
+      <p:ext uri="{BB962C8B-B14F-4D97-AF65-F5344CB8AC3E}">
+        <p14:creationId xmlns:p14="http://schemas.microsoft.com/office/powerpoint/2010/main" val="2102858930"/>
+      </p:ext>
+    </p:extLst>
+  </p:cSld>
+  <p:clrMapOvr>
+    <a:masterClrMapping/>
+  </p:clrMapOvr>
+</p:sld>
+</file>
+
+<file path=ppt/slides/slide18.xml><?xml version="1.0" encoding="utf-8"?>
+<p:sld xmlns:a="http://schemas.openxmlformats.org/drawingml/2006/main" xmlns:r="http://schemas.openxmlformats.org/officeDocument/2006/relationships" xmlns:p="http://schemas.openxmlformats.org/presentationml/2006/main">
+  <p:cSld>
+    <p:spTree>
+      <p:nvGrpSpPr>
+        <p:cNvPr id="1" name=""/>
+        <p:cNvGrpSpPr/>
+        <p:nvPr/>
+      </p:nvGrpSpPr>
+      <p:grpSpPr>
+        <a:xfrm>
+          <a:off x="0" y="0"/>
+          <a:ext cx="0" cy="0"/>
+          <a:chOff x="0" y="0"/>
+          <a:chExt cx="0" cy="0"/>
+        </a:xfrm>
+      </p:grpSpPr>
+      <p:sp>
+        <p:nvSpPr>
+          <p:cNvPr id="2" name="Title 1">
+            <a:extLst>
+              <a:ext uri="{FF2B5EF4-FFF2-40B4-BE49-F238E27FC236}">
+                <a16:creationId xmlns:a16="http://schemas.microsoft.com/office/drawing/2014/main" id="{BDD446CD-C68E-4B34-9354-E8F68D0EB962}"/>
+              </a:ext>
+            </a:extLst>
+          </p:cNvPr>
+          <p:cNvSpPr>
+            <a:spLocks noGrp="1"/>
+          </p:cNvSpPr>
+          <p:nvPr>
+            <p:ph type="title"/>
+          </p:nvPr>
+        </p:nvSpPr>
+        <p:spPr/>
+        <p:txBody>
+          <a:bodyPr/>
+          <a:lstStyle/>
+          <a:p>
+            <a:r>
+              <a:rPr lang="en-US" dirty="0"/>
+              <a:t>Repositories</a:t>
+            </a:r>
+            <a:br>
+              <a:rPr lang="en-US" dirty="0"/>
+            </a:br>
+            <a:r>
+              <a:rPr lang="en-US" sz="3600" dirty="0"/>
+              <a:t>Do not include domain logic</a:t>
+            </a:r>
+            <a:endParaRPr lang="en-US" dirty="0"/>
+          </a:p>
+        </p:txBody>
+      </p:sp>
+      <p:sp>
+        <p:nvSpPr>
+          <p:cNvPr id="7" name="TextBox 6">
+            <a:extLst>
+              <a:ext uri="{FF2B5EF4-FFF2-40B4-BE49-F238E27FC236}">
+                <a16:creationId xmlns:a16="http://schemas.microsoft.com/office/drawing/2014/main" id="{E383A81E-E4B8-4201-98E7-BD4F90DC9FB2}"/>
+              </a:ext>
+            </a:extLst>
+          </p:cNvPr>
+          <p:cNvSpPr txBox="1"/>
+          <p:nvPr/>
+        </p:nvSpPr>
+        <p:spPr>
+          <a:xfrm>
+            <a:off x="7460360" y="5031180"/>
+            <a:ext cx="3893440" cy="461665"/>
+          </a:xfrm>
+          <a:prstGeom prst="rect">
+            <a:avLst/>
+          </a:prstGeom>
+          <a:noFill/>
+        </p:spPr>
+        <p:txBody>
+          <a:bodyPr wrap="square" rtlCol="0">
+            <a:spAutoFit/>
+          </a:bodyPr>
+          <a:lstStyle/>
+          <a:p>
+            <a:r>
+              <a:rPr lang="en-US" sz="2400" dirty="0"/>
+              <a:t>What is an In-Active issue?</a:t>
+            </a:r>
+          </a:p>
+        </p:txBody>
+      </p:sp>
+      <p:pic>
+        <p:nvPicPr>
+          <p:cNvPr id="8" name="Picture 7">
+            <a:extLst>
+              <a:ext uri="{FF2B5EF4-FFF2-40B4-BE49-F238E27FC236}">
+                <a16:creationId xmlns:a16="http://schemas.microsoft.com/office/drawing/2014/main" id="{A4C21B06-1F38-4FC5-97D1-BDC008905D74}"/>
+              </a:ext>
+            </a:extLst>
+          </p:cNvPr>
+          <p:cNvPicPr>
+            <a:picLocks noChangeAspect="1"/>
+          </p:cNvPicPr>
+          <p:nvPr/>
+        </p:nvPicPr>
+        <p:blipFill>
+          <a:blip r:embed="rId2"/>
+          <a:stretch>
+            <a:fillRect/>
+          </a:stretch>
+        </p:blipFill>
+        <p:spPr>
+          <a:xfrm>
+            <a:off x="838201" y="1690688"/>
+            <a:ext cx="6583878" cy="4075483"/>
+          </a:xfrm>
+          <a:prstGeom prst="rect">
+            <a:avLst/>
+          </a:prstGeom>
+        </p:spPr>
+      </p:pic>
+    </p:spTree>
+    <p:extLst>
+      <p:ext uri="{BB962C8B-B14F-4D97-AF65-F5344CB8AC3E}">
+        <p14:creationId xmlns:p14="http://schemas.microsoft.com/office/powerpoint/2010/main" val="694472099"/>
+      </p:ext>
+    </p:extLst>
+  </p:cSld>
+  <p:clrMapOvr>
+    <a:masterClrMapping/>
+  </p:clrMapOvr>
+</p:sld>
+</file>
+
+<file path=ppt/slides/slide19.xml><?xml version="1.0" encoding="utf-8"?>
+<p:sld xmlns:a="http://schemas.openxmlformats.org/drawingml/2006/main" xmlns:r="http://schemas.openxmlformats.org/officeDocument/2006/relationships" xmlns:p="http://schemas.openxmlformats.org/presentationml/2006/main">
+  <p:cSld>
+    <p:spTree>
+      <p:nvGrpSpPr>
+        <p:cNvPr id="1" name=""/>
+        <p:cNvGrpSpPr/>
+        <p:nvPr/>
+      </p:nvGrpSpPr>
+      <p:grpSpPr>
+        <a:xfrm>
+          <a:off x="0" y="0"/>
+          <a:ext cx="0" cy="0"/>
+          <a:chOff x="0" y="0"/>
+          <a:chExt cx="0" cy="0"/>
+        </a:xfrm>
+      </p:grpSpPr>
+      <p:sp>
+        <p:nvSpPr>
+          <p:cNvPr id="2" name="Title 1">
+            <a:extLst>
+              <a:ext uri="{FF2B5EF4-FFF2-40B4-BE49-F238E27FC236}">
+                <a16:creationId xmlns:a16="http://schemas.microsoft.com/office/drawing/2014/main" id="{BDD446CD-C68E-4B34-9354-E8F68D0EB962}"/>
+              </a:ext>
+            </a:extLst>
+          </p:cNvPr>
+          <p:cNvSpPr>
+            <a:spLocks noGrp="1"/>
+          </p:cNvSpPr>
+          <p:nvPr>
+            <p:ph type="title"/>
+          </p:nvPr>
+        </p:nvSpPr>
+        <p:spPr/>
+        <p:txBody>
+          <a:bodyPr/>
+          <a:lstStyle/>
+          <a:p>
+            <a:r>
+              <a:rPr lang="en-US" dirty="0"/>
+              <a:t>Repositories</a:t>
+            </a:r>
+            <a:br>
+              <a:rPr lang="en-US" dirty="0"/>
+            </a:br>
+            <a:r>
+              <a:rPr lang="en-US" sz="3600" dirty="0"/>
+              <a:t>Do not include domain logic</a:t>
+            </a:r>
+            <a:endParaRPr lang="en-US" dirty="0"/>
+          </a:p>
+        </p:txBody>
+      </p:sp>
+      <p:pic>
+        <p:nvPicPr>
+          <p:cNvPr id="3" name="Picture 2">
+            <a:extLst>
+              <a:ext uri="{FF2B5EF4-FFF2-40B4-BE49-F238E27FC236}">
+                <a16:creationId xmlns:a16="http://schemas.microsoft.com/office/drawing/2014/main" id="{0FA1AF23-83C7-4B33-A3A0-ADFC4E0962B1}"/>
+              </a:ext>
+            </a:extLst>
+          </p:cNvPr>
+          <p:cNvPicPr>
+            <a:picLocks noChangeAspect="1"/>
+          </p:cNvPicPr>
+          <p:nvPr/>
+        </p:nvPicPr>
+        <p:blipFill>
+          <a:blip r:embed="rId2"/>
+          <a:stretch>
+            <a:fillRect/>
+          </a:stretch>
+        </p:blipFill>
+        <p:spPr>
+          <a:xfrm>
+            <a:off x="525485" y="1656906"/>
+            <a:ext cx="7193476" cy="5048693"/>
+          </a:xfrm>
+          <a:prstGeom prst="rect">
+            <a:avLst/>
+          </a:prstGeom>
+        </p:spPr>
+      </p:pic>
+      <p:sp>
+        <p:nvSpPr>
+          <p:cNvPr id="8" name="TextBox 7">
+            <a:extLst>
+              <a:ext uri="{FF2B5EF4-FFF2-40B4-BE49-F238E27FC236}">
+                <a16:creationId xmlns:a16="http://schemas.microsoft.com/office/drawing/2014/main" id="{13635787-1E5D-4323-839C-BC7F7CCD3CF1}"/>
+              </a:ext>
+            </a:extLst>
+          </p:cNvPr>
+          <p:cNvSpPr txBox="1"/>
+          <p:nvPr/>
+        </p:nvSpPr>
+        <p:spPr>
+          <a:xfrm>
+            <a:off x="8031676" y="1571503"/>
+            <a:ext cx="3893440" cy="1569660"/>
+          </a:xfrm>
+          <a:prstGeom prst="rect">
+            <a:avLst/>
+          </a:prstGeom>
+          <a:noFill/>
+        </p:spPr>
+        <p:txBody>
+          <a:bodyPr wrap="square" rtlCol="0">
+            <a:spAutoFit/>
+          </a:bodyPr>
+          <a:lstStyle/>
+          <a:p>
+            <a:pPr marL="342900" indent="-342900">
+              <a:buFont typeface="Arial" panose="020B0604020202020204" pitchFamily="34" charset="0"/>
+              <a:buChar char="•"/>
+            </a:pPr>
+            <a:r>
+              <a:rPr lang="en-US" sz="2400" dirty="0"/>
+              <a:t>Implicit definition of a domain rule!</a:t>
+            </a:r>
+          </a:p>
+          <a:p>
+            <a:pPr marL="342900" indent="-342900">
+              <a:buFont typeface="Arial" panose="020B0604020202020204" pitchFamily="34" charset="0"/>
+              <a:buChar char="•"/>
+            </a:pPr>
+            <a:r>
+              <a:rPr lang="en-US" sz="2400" dirty="0"/>
+              <a:t>How to re-use this expression? Copy/paste?</a:t>
+            </a:r>
+          </a:p>
+        </p:txBody>
+      </p:sp>
+    </p:spTree>
+    <p:extLst>
+      <p:ext uri="{BB962C8B-B14F-4D97-AF65-F5344CB8AC3E}">
+        <p14:creationId xmlns:p14="http://schemas.microsoft.com/office/powerpoint/2010/main" val="907533263"/>
+      </p:ext>
+    </p:extLst>
+  </p:cSld>
+  <p:clrMapOvr>
+    <a:masterClrMapping/>
+  </p:clrMapOvr>
+</p:sld>
+</file>
+
 <file path=ppt/slides/slide2.xml><?xml version="1.0" encoding="utf-8"?>
 <p:sld xmlns:a="http://schemas.openxmlformats.org/drawingml/2006/main" xmlns:r="http://schemas.openxmlformats.org/officeDocument/2006/relationships" xmlns:p="http://schemas.openxmlformats.org/presentationml/2006/main">
   <p:cSld>
@@ -5121,6 +5529,563 @@
     <p:extLst>
       <p:ext uri="{BB962C8B-B14F-4D97-AF65-F5344CB8AC3E}">
         <p14:creationId xmlns:p14="http://schemas.microsoft.com/office/powerpoint/2010/main" val="2789523486"/>
+      </p:ext>
+    </p:extLst>
+  </p:cSld>
+  <p:clrMapOvr>
+    <a:masterClrMapping/>
+  </p:clrMapOvr>
+</p:sld>
+</file>
+
+<file path=ppt/slides/slide20.xml><?xml version="1.0" encoding="utf-8"?>
+<p:sld xmlns:a="http://schemas.openxmlformats.org/drawingml/2006/main" xmlns:r="http://schemas.openxmlformats.org/officeDocument/2006/relationships" xmlns:p="http://schemas.openxmlformats.org/presentationml/2006/main">
+  <p:cSld>
+    <p:spTree>
+      <p:nvGrpSpPr>
+        <p:cNvPr id="1" name=""/>
+        <p:cNvGrpSpPr/>
+        <p:nvPr/>
+      </p:nvGrpSpPr>
+      <p:grpSpPr>
+        <a:xfrm>
+          <a:off x="0" y="0"/>
+          <a:ext cx="0" cy="0"/>
+          <a:chOff x="0" y="0"/>
+          <a:chExt cx="0" cy="0"/>
+        </a:xfrm>
+      </p:grpSpPr>
+      <p:sp>
+        <p:nvSpPr>
+          <p:cNvPr id="2" name="Title 1">
+            <a:extLst>
+              <a:ext uri="{FF2B5EF4-FFF2-40B4-BE49-F238E27FC236}">
+                <a16:creationId xmlns:a16="http://schemas.microsoft.com/office/drawing/2014/main" id="{BDD446CD-C68E-4B34-9354-E8F68D0EB962}"/>
+              </a:ext>
+            </a:extLst>
+          </p:cNvPr>
+          <p:cNvSpPr>
+            <a:spLocks noGrp="1"/>
+          </p:cNvSpPr>
+          <p:nvPr>
+            <p:ph type="title"/>
+          </p:nvPr>
+        </p:nvSpPr>
+        <p:spPr/>
+        <p:txBody>
+          <a:bodyPr/>
+          <a:lstStyle/>
+          <a:p>
+            <a:r>
+              <a:rPr lang="en-US" dirty="0"/>
+              <a:t>Repositories</a:t>
+            </a:r>
+            <a:br>
+              <a:rPr lang="en-US" dirty="0"/>
+            </a:br>
+            <a:r>
+              <a:rPr lang="en-US" sz="3600" dirty="0"/>
+              <a:t>Do not include domain logic</a:t>
+            </a:r>
+            <a:endParaRPr lang="en-US" dirty="0"/>
+          </a:p>
+        </p:txBody>
+      </p:sp>
+      <p:sp>
+        <p:nvSpPr>
+          <p:cNvPr id="8" name="TextBox 7">
+            <a:extLst>
+              <a:ext uri="{FF2B5EF4-FFF2-40B4-BE49-F238E27FC236}">
+                <a16:creationId xmlns:a16="http://schemas.microsoft.com/office/drawing/2014/main" id="{13635787-1E5D-4323-839C-BC7F7CCD3CF1}"/>
+              </a:ext>
+            </a:extLst>
+          </p:cNvPr>
+          <p:cNvSpPr txBox="1"/>
+          <p:nvPr/>
+        </p:nvSpPr>
+        <p:spPr>
+          <a:xfrm>
+            <a:off x="8031676" y="1571503"/>
+            <a:ext cx="3893440" cy="2677656"/>
+          </a:xfrm>
+          <a:prstGeom prst="rect">
+            <a:avLst/>
+          </a:prstGeom>
+          <a:noFill/>
+        </p:spPr>
+        <p:txBody>
+          <a:bodyPr wrap="square" rtlCol="0">
+            <a:spAutoFit/>
+          </a:bodyPr>
+          <a:lstStyle/>
+          <a:p>
+            <a:pPr marL="342900" indent="-342900">
+              <a:buFont typeface="Arial" panose="020B0604020202020204" pitchFamily="34" charset="0"/>
+              <a:buChar char="•"/>
+            </a:pPr>
+            <a:r>
+              <a:rPr lang="en-US" sz="2400" dirty="0"/>
+              <a:t>Implicit definition of a domain rule!</a:t>
+            </a:r>
+          </a:p>
+          <a:p>
+            <a:pPr marL="342900" indent="-342900">
+              <a:buFont typeface="Arial" panose="020B0604020202020204" pitchFamily="34" charset="0"/>
+              <a:buChar char="•"/>
+            </a:pPr>
+            <a:r>
+              <a:rPr lang="en-US" sz="2400" dirty="0"/>
+              <a:t>How to re-use this expression? Copy/paste?</a:t>
+            </a:r>
+          </a:p>
+          <a:p>
+            <a:pPr marL="342900" indent="-342900">
+              <a:buFont typeface="Arial" panose="020B0604020202020204" pitchFamily="34" charset="0"/>
+              <a:buChar char="•"/>
+            </a:pPr>
+            <a:r>
+              <a:rPr lang="en-US" sz="2400" b="1" dirty="0"/>
+              <a:t>Solution: Specification Pattern! (will be explained in the next slides)</a:t>
+            </a:r>
+          </a:p>
+        </p:txBody>
+      </p:sp>
+      <p:pic>
+        <p:nvPicPr>
+          <p:cNvPr id="5" name="Picture 4">
+            <a:extLst>
+              <a:ext uri="{FF2B5EF4-FFF2-40B4-BE49-F238E27FC236}">
+                <a16:creationId xmlns:a16="http://schemas.microsoft.com/office/drawing/2014/main" id="{42664024-8FF5-4BD0-8B85-25CFB0BFFA21}"/>
+              </a:ext>
+            </a:extLst>
+          </p:cNvPr>
+          <p:cNvPicPr>
+            <a:picLocks noChangeAspect="1"/>
+          </p:cNvPicPr>
+          <p:nvPr/>
+        </p:nvPicPr>
+        <p:blipFill>
+          <a:blip r:embed="rId2"/>
+          <a:stretch>
+            <a:fillRect/>
+          </a:stretch>
+        </p:blipFill>
+        <p:spPr>
+          <a:xfrm>
+            <a:off x="948020" y="1634836"/>
+            <a:ext cx="5944337" cy="5080660"/>
+          </a:xfrm>
+          <a:prstGeom prst="rect">
+            <a:avLst/>
+          </a:prstGeom>
+        </p:spPr>
+      </p:pic>
+    </p:spTree>
+    <p:extLst>
+      <p:ext uri="{BB962C8B-B14F-4D97-AF65-F5344CB8AC3E}">
+        <p14:creationId xmlns:p14="http://schemas.microsoft.com/office/powerpoint/2010/main" val="1942012890"/>
+      </p:ext>
+    </p:extLst>
+  </p:cSld>
+  <p:clrMapOvr>
+    <a:masterClrMapping/>
+  </p:clrMapOvr>
+</p:sld>
+</file>
+
+<file path=ppt/slides/slide21.xml><?xml version="1.0" encoding="utf-8"?>
+<p:sld xmlns:a="http://schemas.openxmlformats.org/drawingml/2006/main" xmlns:r="http://schemas.openxmlformats.org/officeDocument/2006/relationships" xmlns:p="http://schemas.openxmlformats.org/presentationml/2006/main">
+  <p:cSld>
+    <p:spTree>
+      <p:nvGrpSpPr>
+        <p:cNvPr id="1" name=""/>
+        <p:cNvGrpSpPr/>
+        <p:nvPr/>
+      </p:nvGrpSpPr>
+      <p:grpSpPr>
+        <a:xfrm>
+          <a:off x="0" y="0"/>
+          <a:ext cx="0" cy="0"/>
+          <a:chOff x="0" y="0"/>
+          <a:chExt cx="0" cy="0"/>
+        </a:xfrm>
+      </p:grpSpPr>
+      <p:sp>
+        <p:nvSpPr>
+          <p:cNvPr id="2" name="Title 1">
+            <a:extLst>
+              <a:ext uri="{FF2B5EF4-FFF2-40B4-BE49-F238E27FC236}">
+                <a16:creationId xmlns:a16="http://schemas.microsoft.com/office/drawing/2014/main" id="{BDD446CD-C68E-4B34-9354-E8F68D0EB962}"/>
+              </a:ext>
+            </a:extLst>
+          </p:cNvPr>
+          <p:cNvSpPr>
+            <a:spLocks noGrp="1"/>
+          </p:cNvSpPr>
+          <p:nvPr>
+            <p:ph type="title"/>
+          </p:nvPr>
+        </p:nvSpPr>
+        <p:spPr/>
+        <p:txBody>
+          <a:bodyPr/>
+          <a:lstStyle/>
+          <a:p>
+            <a:r>
+              <a:rPr lang="en-US" dirty="0"/>
+              <a:t>Repositories</a:t>
+            </a:r>
+            <a:br>
+              <a:rPr lang="en-US" dirty="0"/>
+            </a:br>
+            <a:r>
+              <a:rPr lang="en-US" sz="3600" dirty="0"/>
+              <a:t>Querying</a:t>
+            </a:r>
+            <a:endParaRPr lang="en-US" dirty="0"/>
+          </a:p>
+        </p:txBody>
+      </p:sp>
+      <p:pic>
+        <p:nvPicPr>
+          <p:cNvPr id="3" name="Picture 2">
+            <a:extLst>
+              <a:ext uri="{FF2B5EF4-FFF2-40B4-BE49-F238E27FC236}">
+                <a16:creationId xmlns:a16="http://schemas.microsoft.com/office/drawing/2014/main" id="{6EC51A68-EA70-4F50-9A9F-4D510AE7E3C2}"/>
+              </a:ext>
+            </a:extLst>
+          </p:cNvPr>
+          <p:cNvPicPr>
+            <a:picLocks noChangeAspect="1"/>
+          </p:cNvPicPr>
+          <p:nvPr/>
+        </p:nvPicPr>
+        <p:blipFill>
+          <a:blip r:embed="rId2"/>
+          <a:stretch>
+            <a:fillRect/>
+          </a:stretch>
+        </p:blipFill>
+        <p:spPr>
+          <a:xfrm>
+            <a:off x="838200" y="1659905"/>
+            <a:ext cx="4233925" cy="3022931"/>
+          </a:xfrm>
+          <a:prstGeom prst="rect">
+            <a:avLst/>
+          </a:prstGeom>
+        </p:spPr>
+      </p:pic>
+      <p:pic>
+        <p:nvPicPr>
+          <p:cNvPr id="4" name="Picture 3">
+            <a:extLst>
+              <a:ext uri="{FF2B5EF4-FFF2-40B4-BE49-F238E27FC236}">
+                <a16:creationId xmlns:a16="http://schemas.microsoft.com/office/drawing/2014/main" id="{BC4F21F5-B569-4D96-BBEE-735F40DDD2CA}"/>
+              </a:ext>
+            </a:extLst>
+          </p:cNvPr>
+          <p:cNvPicPr>
+            <a:picLocks noChangeAspect="1"/>
+          </p:cNvPicPr>
+          <p:nvPr/>
+        </p:nvPicPr>
+        <p:blipFill>
+          <a:blip r:embed="rId3"/>
+          <a:stretch>
+            <a:fillRect/>
+          </a:stretch>
+        </p:blipFill>
+        <p:spPr>
+          <a:xfrm>
+            <a:off x="6834311" y="2167244"/>
+            <a:ext cx="4931167" cy="1728450"/>
+          </a:xfrm>
+          <a:prstGeom prst="rect">
+            <a:avLst/>
+          </a:prstGeom>
+        </p:spPr>
+      </p:pic>
+      <p:sp>
+        <p:nvSpPr>
+          <p:cNvPr id="6" name="Arrow: Right 5">
+            <a:extLst>
+              <a:ext uri="{FF2B5EF4-FFF2-40B4-BE49-F238E27FC236}">
+                <a16:creationId xmlns:a16="http://schemas.microsoft.com/office/drawing/2014/main" id="{E10BC940-1850-4062-951A-6FA5B17106C4}"/>
+              </a:ext>
+            </a:extLst>
+          </p:cNvPr>
+          <p:cNvSpPr/>
+          <p:nvPr/>
+        </p:nvSpPr>
+        <p:spPr>
+          <a:xfrm>
+            <a:off x="5288478" y="2825683"/>
+            <a:ext cx="1041070" cy="411572"/>
+          </a:xfrm>
+          <a:prstGeom prst="rightArrow">
+            <a:avLst/>
+          </a:prstGeom>
+        </p:spPr>
+        <p:style>
+          <a:lnRef idx="2">
+            <a:schemeClr val="accent2">
+              <a:shade val="50000"/>
+            </a:schemeClr>
+          </a:lnRef>
+          <a:fillRef idx="1">
+            <a:schemeClr val="accent2"/>
+          </a:fillRef>
+          <a:effectRef idx="0">
+            <a:schemeClr val="accent2"/>
+          </a:effectRef>
+          <a:fontRef idx="minor">
+            <a:schemeClr val="lt1"/>
+          </a:fontRef>
+        </p:style>
+        <p:txBody>
+          <a:bodyPr rtlCol="0" anchor="ctr"/>
+          <a:lstStyle/>
+          <a:p>
+            <a:pPr algn="ctr"/>
+            <a:endParaRPr lang="en-US"/>
+          </a:p>
+        </p:txBody>
+      </p:sp>
+    </p:spTree>
+    <p:extLst>
+      <p:ext uri="{BB962C8B-B14F-4D97-AF65-F5344CB8AC3E}">
+        <p14:creationId xmlns:p14="http://schemas.microsoft.com/office/powerpoint/2010/main" val="539640982"/>
+      </p:ext>
+    </p:extLst>
+  </p:cSld>
+  <p:clrMapOvr>
+    <a:masterClrMapping/>
+  </p:clrMapOvr>
+</p:sld>
+</file>
+
+<file path=ppt/slides/slide22.xml><?xml version="1.0" encoding="utf-8"?>
+<p:sld xmlns:a="http://schemas.openxmlformats.org/drawingml/2006/main" xmlns:r="http://schemas.openxmlformats.org/officeDocument/2006/relationships" xmlns:p="http://schemas.openxmlformats.org/presentationml/2006/main">
+  <p:cSld>
+    <p:spTree>
+      <p:nvGrpSpPr>
+        <p:cNvPr id="1" name=""/>
+        <p:cNvGrpSpPr/>
+        <p:nvPr/>
+      </p:nvGrpSpPr>
+      <p:grpSpPr>
+        <a:xfrm>
+          <a:off x="0" y="0"/>
+          <a:ext cx="0" cy="0"/>
+          <a:chOff x="0" y="0"/>
+          <a:chExt cx="0" cy="0"/>
+        </a:xfrm>
+      </p:grpSpPr>
+      <p:sp>
+        <p:nvSpPr>
+          <p:cNvPr id="2" name="Title 1">
+            <a:extLst>
+              <a:ext uri="{FF2B5EF4-FFF2-40B4-BE49-F238E27FC236}">
+                <a16:creationId xmlns:a16="http://schemas.microsoft.com/office/drawing/2014/main" id="{BB5A459E-6CBC-44E2-99B0-6203402BE72F}"/>
+              </a:ext>
+            </a:extLst>
+          </p:cNvPr>
+          <p:cNvSpPr>
+            <a:spLocks noGrp="1"/>
+          </p:cNvSpPr>
+          <p:nvPr>
+            <p:ph type="title"/>
+          </p:nvPr>
+        </p:nvSpPr>
+        <p:spPr/>
+        <p:txBody>
+          <a:bodyPr/>
+          <a:lstStyle/>
+          <a:p>
+            <a:r>
+              <a:rPr lang="en-US" dirty="0"/>
+              <a:t>Repositories</a:t>
+            </a:r>
+            <a:br>
+              <a:rPr lang="en-US" dirty="0"/>
+            </a:br>
+            <a:r>
+              <a:rPr lang="en-US" sz="3600" dirty="0"/>
+              <a:t>Querying / Read Models</a:t>
+            </a:r>
+            <a:endParaRPr lang="en-US" dirty="0"/>
+          </a:p>
+        </p:txBody>
+      </p:sp>
+      <p:sp>
+        <p:nvSpPr>
+          <p:cNvPr id="3" name="Content Placeholder 2">
+            <a:extLst>
+              <a:ext uri="{FF2B5EF4-FFF2-40B4-BE49-F238E27FC236}">
+                <a16:creationId xmlns:a16="http://schemas.microsoft.com/office/drawing/2014/main" id="{DA537E21-1A01-4199-BD9E-3FF6FD74277B}"/>
+              </a:ext>
+            </a:extLst>
+          </p:cNvPr>
+          <p:cNvSpPr>
+            <a:spLocks noGrp="1"/>
+          </p:cNvSpPr>
+          <p:nvPr>
+            <p:ph idx="1"/>
+          </p:nvPr>
+        </p:nvSpPr>
+        <p:spPr/>
+        <p:txBody>
+          <a:bodyPr/>
+          <a:lstStyle/>
+          <a:p>
+            <a:r>
+              <a:rPr lang="en-US" dirty="0"/>
+              <a:t>Read model: A special entity-like class to read data from the database.</a:t>
+            </a:r>
+          </a:p>
+          <a:p>
+            <a:r>
+              <a:rPr lang="en-US" dirty="0"/>
+              <a:t>Minimize read models, do not use for single-entity operations</a:t>
+            </a:r>
+          </a:p>
+          <a:p>
+            <a:r>
+              <a:rPr lang="en-US" dirty="0"/>
+              <a:t>Define &amp; use read models only in performance critical parts</a:t>
+            </a:r>
+          </a:p>
+          <a:p>
+            <a:pPr lvl="1"/>
+            <a:r>
+              <a:rPr lang="en-US" dirty="0"/>
+              <a:t>TODO: Example</a:t>
+            </a:r>
+          </a:p>
+          <a:p>
+            <a:r>
+              <a:rPr lang="en-US" dirty="0"/>
+              <a:t>Do not reuse aggregate roots or entities inside read models</a:t>
+            </a:r>
+          </a:p>
+          <a:p>
+            <a:pPr lvl="1"/>
+            <a:r>
+              <a:rPr lang="en-US" dirty="0"/>
+              <a:t>TODO: Example (</a:t>
+            </a:r>
+            <a:r>
+              <a:rPr lang="en-US" dirty="0" err="1"/>
+              <a:t>UserWithRole</a:t>
+            </a:r>
+            <a:r>
+              <a:rPr lang="en-US" dirty="0"/>
+              <a:t>, </a:t>
+            </a:r>
+            <a:r>
+              <a:rPr lang="en-US" dirty="0" err="1"/>
+              <a:t>SimpleUser</a:t>
+            </a:r>
+            <a:r>
+              <a:rPr lang="en-US" dirty="0"/>
+              <a:t>, </a:t>
+            </a:r>
+            <a:r>
+              <a:rPr lang="en-US" dirty="0" err="1"/>
+              <a:t>DetailedUser</a:t>
+            </a:r>
+            <a:r>
+              <a:rPr lang="en-US" dirty="0"/>
+              <a:t>… etc.)</a:t>
+            </a:r>
+          </a:p>
+        </p:txBody>
+      </p:sp>
+    </p:spTree>
+    <p:extLst>
+      <p:ext uri="{BB962C8B-B14F-4D97-AF65-F5344CB8AC3E}">
+        <p14:creationId xmlns:p14="http://schemas.microsoft.com/office/powerpoint/2010/main" val="171990646"/>
+      </p:ext>
+    </p:extLst>
+  </p:cSld>
+  <p:clrMapOvr>
+    <a:masterClrMapping/>
+  </p:clrMapOvr>
+</p:sld>
+</file>
+
+<file path=ppt/slides/slide23.xml><?xml version="1.0" encoding="utf-8"?>
+<p:sld xmlns:a="http://schemas.openxmlformats.org/drawingml/2006/main" xmlns:r="http://schemas.openxmlformats.org/officeDocument/2006/relationships" xmlns:p="http://schemas.openxmlformats.org/presentationml/2006/main">
+  <p:cSld>
+    <p:spTree>
+      <p:nvGrpSpPr>
+        <p:cNvPr id="1" name=""/>
+        <p:cNvGrpSpPr/>
+        <p:nvPr/>
+      </p:nvGrpSpPr>
+      <p:grpSpPr>
+        <a:xfrm>
+          <a:off x="0" y="0"/>
+          <a:ext cx="0" cy="0"/>
+          <a:chOff x="0" y="0"/>
+          <a:chExt cx="0" cy="0"/>
+        </a:xfrm>
+      </p:grpSpPr>
+      <p:sp>
+        <p:nvSpPr>
+          <p:cNvPr id="2" name="Title 1">
+            <a:extLst>
+              <a:ext uri="{FF2B5EF4-FFF2-40B4-BE49-F238E27FC236}">
+                <a16:creationId xmlns:a16="http://schemas.microsoft.com/office/drawing/2014/main" id="{DCD406CE-839F-4199-B466-22AF20DC69E4}"/>
+              </a:ext>
+            </a:extLst>
+          </p:cNvPr>
+          <p:cNvSpPr>
+            <a:spLocks noGrp="1"/>
+          </p:cNvSpPr>
+          <p:nvPr>
+            <p:ph type="title"/>
+          </p:nvPr>
+        </p:nvSpPr>
+        <p:spPr/>
+        <p:txBody>
+          <a:bodyPr/>
+          <a:lstStyle/>
+          <a:p>
+            <a:endParaRPr lang="en-US" dirty="0"/>
+          </a:p>
+        </p:txBody>
+      </p:sp>
+      <p:sp>
+        <p:nvSpPr>
+          <p:cNvPr id="3" name="Content Placeholder 2">
+            <a:extLst>
+              <a:ext uri="{FF2B5EF4-FFF2-40B4-BE49-F238E27FC236}">
+                <a16:creationId xmlns:a16="http://schemas.microsoft.com/office/drawing/2014/main" id="{4594C836-7ABE-4497-B60B-67B7615CB160}"/>
+              </a:ext>
+            </a:extLst>
+          </p:cNvPr>
+          <p:cNvSpPr>
+            <a:spLocks noGrp="1"/>
+          </p:cNvSpPr>
+          <p:nvPr>
+            <p:ph idx="1"/>
+          </p:nvPr>
+        </p:nvSpPr>
+        <p:spPr/>
+        <p:txBody>
+          <a:bodyPr/>
+          <a:lstStyle/>
+          <a:p>
+            <a:endParaRPr lang="en-US"/>
+          </a:p>
+        </p:txBody>
+      </p:sp>
+    </p:spTree>
+    <p:extLst>
+      <p:ext uri="{BB962C8B-B14F-4D97-AF65-F5344CB8AC3E}">
+        <p14:creationId xmlns:p14="http://schemas.microsoft.com/office/powerpoint/2010/main" val="2340709840"/>
       </p:ext>
     </p:extLst>
   </p:cSld>
@@ -5648,7 +6613,7 @@
           <a:p>
             <a:r>
               <a:rPr lang="en-US" dirty="0"/>
-              <a:t>Saved &amp; Retrieved as a single unit (with sub-collections)</a:t>
+              <a:t>Saved &amp; retrieved as a single unit (with sub-collections)</a:t>
             </a:r>
           </a:p>
         </p:txBody>
@@ -5751,52 +6716,6 @@
           </a:prstGeom>
         </p:spPr>
       </p:pic>
-      <p:sp>
-        <p:nvSpPr>
-          <p:cNvPr id="11" name="Rectangle 10">
-            <a:extLst>
-              <a:ext uri="{FF2B5EF4-FFF2-40B4-BE49-F238E27FC236}">
-                <a16:creationId xmlns:a16="http://schemas.microsoft.com/office/drawing/2014/main" id="{E8C85DFD-D7EA-4056-B3E5-4DC78CEBE1D8}"/>
-              </a:ext>
-            </a:extLst>
-          </p:cNvPr>
-          <p:cNvSpPr/>
-          <p:nvPr/>
-        </p:nvSpPr>
-        <p:spPr>
-          <a:xfrm>
-            <a:off x="7726878" y="1809792"/>
-            <a:ext cx="3443843" cy="830997"/>
-          </a:xfrm>
-          <a:prstGeom prst="rect">
-            <a:avLst/>
-          </a:prstGeom>
-        </p:spPr>
-        <p:txBody>
-          <a:bodyPr wrap="square">
-            <a:spAutoFit/>
-          </a:bodyPr>
-          <a:lstStyle/>
-          <a:p>
-            <a:r>
-              <a:rPr lang="en-US" sz="2400" u="sng" dirty="0">
-                <a:solidFill>
-                  <a:srgbClr val="00B0F0"/>
-                </a:solidFill>
-              </a:rPr>
-              <a:t>PRINCIPLE</a:t>
-            </a:r>
-            <a:r>
-              <a:rPr lang="en-US" sz="2400" dirty="0">
-                <a:solidFill>
-                  <a:srgbClr val="00B0F0"/>
-                </a:solidFill>
-              </a:rPr>
-              <a:t>: save &amp; retrieve as a single unit</a:t>
-            </a:r>
-          </a:p>
-        </p:txBody>
-      </p:sp>
       <p:pic>
         <p:nvPicPr>
           <p:cNvPr id="14" name="Picture 13">

</xml_diff>